<commit_message>
Update Lecture 3 - Representing Numbers in Binary.pptx
headings
</commit_message>
<xml_diff>
--- a/wip/Lecture 3 - Representing Numbers in Binary.pptx
+++ b/wip/Lecture 3 - Representing Numbers in Binary.pptx
@@ -210,7 +210,596 @@
       </a:defRPr>
     </a:lvl9pPr>
   </p:defaultTextStyle>
+  <p:extLst>
+    <p:ext uri="{EFAFB233-063F-42B5-8137-9DF3F51BA10A}">
+      <p15:sldGuideLst xmlns:p15="http://schemas.microsoft.com/office/powerpoint/2012/main"/>
+    </p:ext>
+  </p:extLst>
 </p:presentation>
+</file>
+
+<file path=ppt/changesInfos/changesInfo1.xml><?xml version="1.0" encoding="utf-8"?>
+<pc:chgInfo xmlns:a="http://schemas.openxmlformats.org/drawingml/2006/main" xmlns:r="http://schemas.openxmlformats.org/officeDocument/2006/relationships" xmlns:ac="http://schemas.microsoft.com/office/drawing/2013/main/command" xmlns:pc="http://schemas.microsoft.com/office/powerpoint/2013/main/command">
+  <pc:docChgLst>
+    <pc:chgData name="Joshua Gross" userId="7bb6a70e-9d37-46e4-96de-748557707bd0" providerId="ADAL" clId="{C167259B-8629-4782-A60C-F3EC4D72A2DB}"/>
+    <pc:docChg chg="modSld">
+      <pc:chgData name="Joshua Gross" userId="7bb6a70e-9d37-46e4-96de-748557707bd0" providerId="ADAL" clId="{C167259B-8629-4782-A60C-F3EC4D72A2DB}" dt="2023-08-29T20:47:10.769" v="57"/>
+      <pc:docMkLst>
+        <pc:docMk/>
+      </pc:docMkLst>
+      <pc:sldChg chg="modSp">
+        <pc:chgData name="Joshua Gross" userId="7bb6a70e-9d37-46e4-96de-748557707bd0" providerId="ADAL" clId="{C167259B-8629-4782-A60C-F3EC4D72A2DB}" dt="2023-08-29T20:47:10.769" v="57"/>
+        <pc:sldMkLst>
+          <pc:docMk/>
+          <pc:sldMk cId="2228241863" sldId="313"/>
+        </pc:sldMkLst>
+        <pc:spChg chg="mod">
+          <ac:chgData name="Joshua Gross" userId="7bb6a70e-9d37-46e4-96de-748557707bd0" providerId="ADAL" clId="{C167259B-8629-4782-A60C-F3EC4D72A2DB}" dt="2023-08-29T20:47:10.769" v="57"/>
+          <ac:spMkLst>
+            <pc:docMk/>
+            <pc:sldMk cId="2228241863" sldId="313"/>
+            <ac:spMk id="2" creationId="{4ED975F2-38B5-4FBC-B341-C8E4DCEDFB73}"/>
+          </ac:spMkLst>
+        </pc:spChg>
+      </pc:sldChg>
+      <pc:sldChg chg="modSp">
+        <pc:chgData name="Joshua Gross" userId="7bb6a70e-9d37-46e4-96de-748557707bd0" providerId="ADAL" clId="{C167259B-8629-4782-A60C-F3EC4D72A2DB}" dt="2023-08-29T20:47:06.617" v="56"/>
+        <pc:sldMkLst>
+          <pc:docMk/>
+          <pc:sldMk cId="3262303928" sldId="322"/>
+        </pc:sldMkLst>
+        <pc:spChg chg="mod">
+          <ac:chgData name="Joshua Gross" userId="7bb6a70e-9d37-46e4-96de-748557707bd0" providerId="ADAL" clId="{C167259B-8629-4782-A60C-F3EC4D72A2DB}" dt="2023-08-29T20:47:06.617" v="56"/>
+          <ac:spMkLst>
+            <pc:docMk/>
+            <pc:sldMk cId="3262303928" sldId="322"/>
+            <ac:spMk id="2" creationId="{4ED975F2-38B5-4FBC-B341-C8E4DCEDFB73}"/>
+          </ac:spMkLst>
+        </pc:spChg>
+      </pc:sldChg>
+      <pc:sldChg chg="modSp">
+        <pc:chgData name="Joshua Gross" userId="7bb6a70e-9d37-46e4-96de-748557707bd0" providerId="ADAL" clId="{C167259B-8629-4782-A60C-F3EC4D72A2DB}" dt="2023-08-29T20:47:02.416" v="55"/>
+        <pc:sldMkLst>
+          <pc:docMk/>
+          <pc:sldMk cId="1842311166" sldId="323"/>
+        </pc:sldMkLst>
+        <pc:spChg chg="mod">
+          <ac:chgData name="Joshua Gross" userId="7bb6a70e-9d37-46e4-96de-748557707bd0" providerId="ADAL" clId="{C167259B-8629-4782-A60C-F3EC4D72A2DB}" dt="2023-08-29T20:47:02.416" v="55"/>
+          <ac:spMkLst>
+            <pc:docMk/>
+            <pc:sldMk cId="1842311166" sldId="323"/>
+            <ac:spMk id="2" creationId="{4ED975F2-38B5-4FBC-B341-C8E4DCEDFB73}"/>
+          </ac:spMkLst>
+        </pc:spChg>
+      </pc:sldChg>
+      <pc:sldChg chg="modSp">
+        <pc:chgData name="Joshua Gross" userId="7bb6a70e-9d37-46e4-96de-748557707bd0" providerId="ADAL" clId="{C167259B-8629-4782-A60C-F3EC4D72A2DB}" dt="2023-08-29T20:47:01.370" v="54"/>
+        <pc:sldMkLst>
+          <pc:docMk/>
+          <pc:sldMk cId="3712211208" sldId="324"/>
+        </pc:sldMkLst>
+        <pc:spChg chg="mod">
+          <ac:chgData name="Joshua Gross" userId="7bb6a70e-9d37-46e4-96de-748557707bd0" providerId="ADAL" clId="{C167259B-8629-4782-A60C-F3EC4D72A2DB}" dt="2023-08-29T20:47:01.370" v="54"/>
+          <ac:spMkLst>
+            <pc:docMk/>
+            <pc:sldMk cId="3712211208" sldId="324"/>
+            <ac:spMk id="2" creationId="{4ED975F2-38B5-4FBC-B341-C8E4DCEDFB73}"/>
+          </ac:spMkLst>
+        </pc:spChg>
+      </pc:sldChg>
+      <pc:sldChg chg="modSp">
+        <pc:chgData name="Joshua Gross" userId="7bb6a70e-9d37-46e4-96de-748557707bd0" providerId="ADAL" clId="{C167259B-8629-4782-A60C-F3EC4D72A2DB}" dt="2023-08-29T20:46:59.881" v="53"/>
+        <pc:sldMkLst>
+          <pc:docMk/>
+          <pc:sldMk cId="3378691169" sldId="325"/>
+        </pc:sldMkLst>
+        <pc:spChg chg="mod">
+          <ac:chgData name="Joshua Gross" userId="7bb6a70e-9d37-46e4-96de-748557707bd0" providerId="ADAL" clId="{C167259B-8629-4782-A60C-F3EC4D72A2DB}" dt="2023-08-29T20:46:59.881" v="53"/>
+          <ac:spMkLst>
+            <pc:docMk/>
+            <pc:sldMk cId="3378691169" sldId="325"/>
+            <ac:spMk id="2" creationId="{4ED975F2-38B5-4FBC-B341-C8E4DCEDFB73}"/>
+          </ac:spMkLst>
+        </pc:spChg>
+      </pc:sldChg>
+      <pc:sldChg chg="modSp">
+        <pc:chgData name="Joshua Gross" userId="7bb6a70e-9d37-46e4-96de-748557707bd0" providerId="ADAL" clId="{C167259B-8629-4782-A60C-F3EC4D72A2DB}" dt="2023-08-29T20:46:57.865" v="52"/>
+        <pc:sldMkLst>
+          <pc:docMk/>
+          <pc:sldMk cId="3706382342" sldId="326"/>
+        </pc:sldMkLst>
+        <pc:spChg chg="mod">
+          <ac:chgData name="Joshua Gross" userId="7bb6a70e-9d37-46e4-96de-748557707bd0" providerId="ADAL" clId="{C167259B-8629-4782-A60C-F3EC4D72A2DB}" dt="2023-08-29T20:46:57.865" v="52"/>
+          <ac:spMkLst>
+            <pc:docMk/>
+            <pc:sldMk cId="3706382342" sldId="326"/>
+            <ac:spMk id="2" creationId="{4ED975F2-38B5-4FBC-B341-C8E4DCEDFB73}"/>
+          </ac:spMkLst>
+        </pc:spChg>
+      </pc:sldChg>
+      <pc:sldChg chg="modSp">
+        <pc:chgData name="Joshua Gross" userId="7bb6a70e-9d37-46e4-96de-748557707bd0" providerId="ADAL" clId="{C167259B-8629-4782-A60C-F3EC4D72A2DB}" dt="2023-08-29T20:46:56.762" v="51"/>
+        <pc:sldMkLst>
+          <pc:docMk/>
+          <pc:sldMk cId="2062447067" sldId="327"/>
+        </pc:sldMkLst>
+        <pc:spChg chg="mod">
+          <ac:chgData name="Joshua Gross" userId="7bb6a70e-9d37-46e4-96de-748557707bd0" providerId="ADAL" clId="{C167259B-8629-4782-A60C-F3EC4D72A2DB}" dt="2023-08-29T20:46:56.762" v="51"/>
+          <ac:spMkLst>
+            <pc:docMk/>
+            <pc:sldMk cId="2062447067" sldId="327"/>
+            <ac:spMk id="2" creationId="{4ED975F2-38B5-4FBC-B341-C8E4DCEDFB73}"/>
+          </ac:spMkLst>
+        </pc:spChg>
+      </pc:sldChg>
+      <pc:sldChg chg="modSp">
+        <pc:chgData name="Joshua Gross" userId="7bb6a70e-9d37-46e4-96de-748557707bd0" providerId="ADAL" clId="{C167259B-8629-4782-A60C-F3EC4D72A2DB}" dt="2023-08-29T20:46:55.041" v="50"/>
+        <pc:sldMkLst>
+          <pc:docMk/>
+          <pc:sldMk cId="2155222421" sldId="328"/>
+        </pc:sldMkLst>
+        <pc:spChg chg="mod">
+          <ac:chgData name="Joshua Gross" userId="7bb6a70e-9d37-46e4-96de-748557707bd0" providerId="ADAL" clId="{C167259B-8629-4782-A60C-F3EC4D72A2DB}" dt="2023-08-29T20:46:55.041" v="50"/>
+          <ac:spMkLst>
+            <pc:docMk/>
+            <pc:sldMk cId="2155222421" sldId="328"/>
+            <ac:spMk id="2" creationId="{4ED975F2-38B5-4FBC-B341-C8E4DCEDFB73}"/>
+          </ac:spMkLst>
+        </pc:spChg>
+      </pc:sldChg>
+      <pc:sldChg chg="modSp">
+        <pc:chgData name="Joshua Gross" userId="7bb6a70e-9d37-46e4-96de-748557707bd0" providerId="ADAL" clId="{C167259B-8629-4782-A60C-F3EC4D72A2DB}" dt="2023-08-29T20:46:53.736" v="49"/>
+        <pc:sldMkLst>
+          <pc:docMk/>
+          <pc:sldMk cId="2417955707" sldId="329"/>
+        </pc:sldMkLst>
+        <pc:spChg chg="mod">
+          <ac:chgData name="Joshua Gross" userId="7bb6a70e-9d37-46e4-96de-748557707bd0" providerId="ADAL" clId="{C167259B-8629-4782-A60C-F3EC4D72A2DB}" dt="2023-08-29T20:46:53.736" v="49"/>
+          <ac:spMkLst>
+            <pc:docMk/>
+            <pc:sldMk cId="2417955707" sldId="329"/>
+            <ac:spMk id="2" creationId="{4ED975F2-38B5-4FBC-B341-C8E4DCEDFB73}"/>
+          </ac:spMkLst>
+        </pc:spChg>
+      </pc:sldChg>
+      <pc:sldChg chg="modSp">
+        <pc:chgData name="Joshua Gross" userId="7bb6a70e-9d37-46e4-96de-748557707bd0" providerId="ADAL" clId="{C167259B-8629-4782-A60C-F3EC4D72A2DB}" dt="2023-08-29T20:46:51.993" v="48"/>
+        <pc:sldMkLst>
+          <pc:docMk/>
+          <pc:sldMk cId="2485810951" sldId="330"/>
+        </pc:sldMkLst>
+        <pc:spChg chg="mod">
+          <ac:chgData name="Joshua Gross" userId="7bb6a70e-9d37-46e4-96de-748557707bd0" providerId="ADAL" clId="{C167259B-8629-4782-A60C-F3EC4D72A2DB}" dt="2023-08-29T20:46:51.993" v="48"/>
+          <ac:spMkLst>
+            <pc:docMk/>
+            <pc:sldMk cId="2485810951" sldId="330"/>
+            <ac:spMk id="2" creationId="{4ED975F2-38B5-4FBC-B341-C8E4DCEDFB73}"/>
+          </ac:spMkLst>
+        </pc:spChg>
+      </pc:sldChg>
+      <pc:sldChg chg="modSp">
+        <pc:chgData name="Joshua Gross" userId="7bb6a70e-9d37-46e4-96de-748557707bd0" providerId="ADAL" clId="{C167259B-8629-4782-A60C-F3EC4D72A2DB}" dt="2023-08-29T20:46:49.680" v="47"/>
+        <pc:sldMkLst>
+          <pc:docMk/>
+          <pc:sldMk cId="329338108" sldId="331"/>
+        </pc:sldMkLst>
+        <pc:spChg chg="mod">
+          <ac:chgData name="Joshua Gross" userId="7bb6a70e-9d37-46e4-96de-748557707bd0" providerId="ADAL" clId="{C167259B-8629-4782-A60C-F3EC4D72A2DB}" dt="2023-08-29T20:46:49.680" v="47"/>
+          <ac:spMkLst>
+            <pc:docMk/>
+            <pc:sldMk cId="329338108" sldId="331"/>
+            <ac:spMk id="2" creationId="{4ED975F2-38B5-4FBC-B341-C8E4DCEDFB73}"/>
+          </ac:spMkLst>
+        </pc:spChg>
+      </pc:sldChg>
+      <pc:sldChg chg="modSp">
+        <pc:chgData name="Joshua Gross" userId="7bb6a70e-9d37-46e4-96de-748557707bd0" providerId="ADAL" clId="{C167259B-8629-4782-A60C-F3EC4D72A2DB}" dt="2023-08-29T20:46:47.672" v="46"/>
+        <pc:sldMkLst>
+          <pc:docMk/>
+          <pc:sldMk cId="1609317998" sldId="332"/>
+        </pc:sldMkLst>
+        <pc:spChg chg="mod">
+          <ac:chgData name="Joshua Gross" userId="7bb6a70e-9d37-46e4-96de-748557707bd0" providerId="ADAL" clId="{C167259B-8629-4782-A60C-F3EC4D72A2DB}" dt="2023-08-29T20:46:47.672" v="46"/>
+          <ac:spMkLst>
+            <pc:docMk/>
+            <pc:sldMk cId="1609317998" sldId="332"/>
+            <ac:spMk id="2" creationId="{4ED975F2-38B5-4FBC-B341-C8E4DCEDFB73}"/>
+          </ac:spMkLst>
+        </pc:spChg>
+      </pc:sldChg>
+      <pc:sldChg chg="modSp">
+        <pc:chgData name="Joshua Gross" userId="7bb6a70e-9d37-46e4-96de-748557707bd0" providerId="ADAL" clId="{C167259B-8629-4782-A60C-F3EC4D72A2DB}" dt="2023-08-29T20:46:46.586" v="45"/>
+        <pc:sldMkLst>
+          <pc:docMk/>
+          <pc:sldMk cId="288352015" sldId="333"/>
+        </pc:sldMkLst>
+        <pc:spChg chg="mod">
+          <ac:chgData name="Joshua Gross" userId="7bb6a70e-9d37-46e4-96de-748557707bd0" providerId="ADAL" clId="{C167259B-8629-4782-A60C-F3EC4D72A2DB}" dt="2023-08-29T20:46:46.586" v="45"/>
+          <ac:spMkLst>
+            <pc:docMk/>
+            <pc:sldMk cId="288352015" sldId="333"/>
+            <ac:spMk id="2" creationId="{4ED975F2-38B5-4FBC-B341-C8E4DCEDFB73}"/>
+          </ac:spMkLst>
+        </pc:spChg>
+      </pc:sldChg>
+      <pc:sldChg chg="modSp">
+        <pc:chgData name="Joshua Gross" userId="7bb6a70e-9d37-46e4-96de-748557707bd0" providerId="ADAL" clId="{C167259B-8629-4782-A60C-F3EC4D72A2DB}" dt="2023-08-29T20:46:43.993" v="43"/>
+        <pc:sldMkLst>
+          <pc:docMk/>
+          <pc:sldMk cId="1194280656" sldId="334"/>
+        </pc:sldMkLst>
+        <pc:spChg chg="mod">
+          <ac:chgData name="Joshua Gross" userId="7bb6a70e-9d37-46e4-96de-748557707bd0" providerId="ADAL" clId="{C167259B-8629-4782-A60C-F3EC4D72A2DB}" dt="2023-08-29T20:46:43.993" v="43"/>
+          <ac:spMkLst>
+            <pc:docMk/>
+            <pc:sldMk cId="1194280656" sldId="334"/>
+            <ac:spMk id="2" creationId="{4ED975F2-38B5-4FBC-B341-C8E4DCEDFB73}"/>
+          </ac:spMkLst>
+        </pc:spChg>
+      </pc:sldChg>
+      <pc:sldChg chg="modSp">
+        <pc:chgData name="Joshua Gross" userId="7bb6a70e-9d37-46e4-96de-748557707bd0" providerId="ADAL" clId="{C167259B-8629-4782-A60C-F3EC4D72A2DB}" dt="2023-08-29T20:46:45.477" v="44"/>
+        <pc:sldMkLst>
+          <pc:docMk/>
+          <pc:sldMk cId="2894952224" sldId="335"/>
+        </pc:sldMkLst>
+        <pc:spChg chg="mod">
+          <ac:chgData name="Joshua Gross" userId="7bb6a70e-9d37-46e4-96de-748557707bd0" providerId="ADAL" clId="{C167259B-8629-4782-A60C-F3EC4D72A2DB}" dt="2023-08-29T20:46:45.477" v="44"/>
+          <ac:spMkLst>
+            <pc:docMk/>
+            <pc:sldMk cId="2894952224" sldId="335"/>
+            <ac:spMk id="2" creationId="{4ED975F2-38B5-4FBC-B341-C8E4DCEDFB73}"/>
+          </ac:spMkLst>
+        </pc:spChg>
+      </pc:sldChg>
+      <pc:sldChg chg="modSp">
+        <pc:chgData name="Joshua Gross" userId="7bb6a70e-9d37-46e4-96de-748557707bd0" providerId="ADAL" clId="{C167259B-8629-4782-A60C-F3EC4D72A2DB}" dt="2023-08-29T20:46:42.785" v="42"/>
+        <pc:sldMkLst>
+          <pc:docMk/>
+          <pc:sldMk cId="53817207" sldId="337"/>
+        </pc:sldMkLst>
+        <pc:spChg chg="mod">
+          <ac:chgData name="Joshua Gross" userId="7bb6a70e-9d37-46e4-96de-748557707bd0" providerId="ADAL" clId="{C167259B-8629-4782-A60C-F3EC4D72A2DB}" dt="2023-08-29T20:46:42.785" v="42"/>
+          <ac:spMkLst>
+            <pc:docMk/>
+            <pc:sldMk cId="53817207" sldId="337"/>
+            <ac:spMk id="2" creationId="{4ED975F2-38B5-4FBC-B341-C8E4DCEDFB73}"/>
+          </ac:spMkLst>
+        </pc:spChg>
+      </pc:sldChg>
+      <pc:sldChg chg="modSp">
+        <pc:chgData name="Joshua Gross" userId="7bb6a70e-9d37-46e4-96de-748557707bd0" providerId="ADAL" clId="{C167259B-8629-4782-A60C-F3EC4D72A2DB}" dt="2023-08-29T20:46:33.928" v="40"/>
+        <pc:sldMkLst>
+          <pc:docMk/>
+          <pc:sldMk cId="2105438381" sldId="339"/>
+        </pc:sldMkLst>
+        <pc:spChg chg="mod">
+          <ac:chgData name="Joshua Gross" userId="7bb6a70e-9d37-46e4-96de-748557707bd0" providerId="ADAL" clId="{C167259B-8629-4782-A60C-F3EC4D72A2DB}" dt="2023-08-29T20:46:33.928" v="40"/>
+          <ac:spMkLst>
+            <pc:docMk/>
+            <pc:sldMk cId="2105438381" sldId="339"/>
+            <ac:spMk id="2" creationId="{4ED975F2-38B5-4FBC-B341-C8E4DCEDFB73}"/>
+          </ac:spMkLst>
+        </pc:spChg>
+      </pc:sldChg>
+      <pc:sldChg chg="modSp">
+        <pc:chgData name="Joshua Gross" userId="7bb6a70e-9d37-46e4-96de-748557707bd0" providerId="ADAL" clId="{C167259B-8629-4782-A60C-F3EC4D72A2DB}" dt="2023-08-29T20:46:28.346" v="37"/>
+        <pc:sldMkLst>
+          <pc:docMk/>
+          <pc:sldMk cId="1489716769" sldId="341"/>
+        </pc:sldMkLst>
+        <pc:spChg chg="mod">
+          <ac:chgData name="Joshua Gross" userId="7bb6a70e-9d37-46e4-96de-748557707bd0" providerId="ADAL" clId="{C167259B-8629-4782-A60C-F3EC4D72A2DB}" dt="2023-08-29T20:46:28.346" v="37"/>
+          <ac:spMkLst>
+            <pc:docMk/>
+            <pc:sldMk cId="1489716769" sldId="341"/>
+            <ac:spMk id="2" creationId="{4ED975F2-38B5-4FBC-B341-C8E4DCEDFB73}"/>
+          </ac:spMkLst>
+        </pc:spChg>
+      </pc:sldChg>
+      <pc:sldChg chg="modSp">
+        <pc:chgData name="Joshua Gross" userId="7bb6a70e-9d37-46e4-96de-748557707bd0" providerId="ADAL" clId="{C167259B-8629-4782-A60C-F3EC4D72A2DB}" dt="2023-08-29T20:46:30.141" v="38"/>
+        <pc:sldMkLst>
+          <pc:docMk/>
+          <pc:sldMk cId="1693352643" sldId="342"/>
+        </pc:sldMkLst>
+        <pc:spChg chg="mod">
+          <ac:chgData name="Joshua Gross" userId="7bb6a70e-9d37-46e4-96de-748557707bd0" providerId="ADAL" clId="{C167259B-8629-4782-A60C-F3EC4D72A2DB}" dt="2023-08-29T20:46:30.141" v="38"/>
+          <ac:spMkLst>
+            <pc:docMk/>
+            <pc:sldMk cId="1693352643" sldId="342"/>
+            <ac:spMk id="2" creationId="{4ED975F2-38B5-4FBC-B341-C8E4DCEDFB73}"/>
+          </ac:spMkLst>
+        </pc:spChg>
+      </pc:sldChg>
+      <pc:sldChg chg="modSp">
+        <pc:chgData name="Joshua Gross" userId="7bb6a70e-9d37-46e4-96de-748557707bd0" providerId="ADAL" clId="{C167259B-8629-4782-A60C-F3EC4D72A2DB}" dt="2023-08-29T20:46:31.920" v="39"/>
+        <pc:sldMkLst>
+          <pc:docMk/>
+          <pc:sldMk cId="3654374356" sldId="343"/>
+        </pc:sldMkLst>
+        <pc:spChg chg="mod">
+          <ac:chgData name="Joshua Gross" userId="7bb6a70e-9d37-46e4-96de-748557707bd0" providerId="ADAL" clId="{C167259B-8629-4782-A60C-F3EC4D72A2DB}" dt="2023-08-29T20:46:31.920" v="39"/>
+          <ac:spMkLst>
+            <pc:docMk/>
+            <pc:sldMk cId="3654374356" sldId="343"/>
+            <ac:spMk id="2" creationId="{4ED975F2-38B5-4FBC-B341-C8E4DCEDFB73}"/>
+          </ac:spMkLst>
+        </pc:spChg>
+      </pc:sldChg>
+      <pc:sldChg chg="modSp">
+        <pc:chgData name="Joshua Gross" userId="7bb6a70e-9d37-46e4-96de-748557707bd0" providerId="ADAL" clId="{C167259B-8629-4782-A60C-F3EC4D72A2DB}" dt="2023-08-29T20:46:27.345" v="36"/>
+        <pc:sldMkLst>
+          <pc:docMk/>
+          <pc:sldMk cId="2468105187" sldId="344"/>
+        </pc:sldMkLst>
+        <pc:spChg chg="mod">
+          <ac:chgData name="Joshua Gross" userId="7bb6a70e-9d37-46e4-96de-748557707bd0" providerId="ADAL" clId="{C167259B-8629-4782-A60C-F3EC4D72A2DB}" dt="2023-08-29T20:46:27.345" v="36"/>
+          <ac:spMkLst>
+            <pc:docMk/>
+            <pc:sldMk cId="2468105187" sldId="344"/>
+            <ac:spMk id="2" creationId="{4ED975F2-38B5-4FBC-B341-C8E4DCEDFB73}"/>
+          </ac:spMkLst>
+        </pc:spChg>
+      </pc:sldChg>
+      <pc:sldChg chg="modSp">
+        <pc:chgData name="Joshua Gross" userId="7bb6a70e-9d37-46e4-96de-748557707bd0" providerId="ADAL" clId="{C167259B-8629-4782-A60C-F3EC4D72A2DB}" dt="2023-08-29T20:46:25.600" v="35"/>
+        <pc:sldMkLst>
+          <pc:docMk/>
+          <pc:sldMk cId="1448728390" sldId="345"/>
+        </pc:sldMkLst>
+        <pc:spChg chg="mod">
+          <ac:chgData name="Joshua Gross" userId="7bb6a70e-9d37-46e4-96de-748557707bd0" providerId="ADAL" clId="{C167259B-8629-4782-A60C-F3EC4D72A2DB}" dt="2023-08-29T20:46:25.600" v="35"/>
+          <ac:spMkLst>
+            <pc:docMk/>
+            <pc:sldMk cId="1448728390" sldId="345"/>
+            <ac:spMk id="2" creationId="{4ED975F2-38B5-4FBC-B341-C8E4DCEDFB73}"/>
+          </ac:spMkLst>
+        </pc:spChg>
+      </pc:sldChg>
+      <pc:sldChg chg="modSp">
+        <pc:chgData name="Joshua Gross" userId="7bb6a70e-9d37-46e4-96de-748557707bd0" providerId="ADAL" clId="{C167259B-8629-4782-A60C-F3EC4D72A2DB}" dt="2023-08-29T20:46:23.904" v="34"/>
+        <pc:sldMkLst>
+          <pc:docMk/>
+          <pc:sldMk cId="1607481812" sldId="346"/>
+        </pc:sldMkLst>
+        <pc:spChg chg="mod">
+          <ac:chgData name="Joshua Gross" userId="7bb6a70e-9d37-46e4-96de-748557707bd0" providerId="ADAL" clId="{C167259B-8629-4782-A60C-F3EC4D72A2DB}" dt="2023-08-29T20:46:23.904" v="34"/>
+          <ac:spMkLst>
+            <pc:docMk/>
+            <pc:sldMk cId="1607481812" sldId="346"/>
+            <ac:spMk id="2" creationId="{4ED975F2-38B5-4FBC-B341-C8E4DCEDFB73}"/>
+          </ac:spMkLst>
+        </pc:spChg>
+      </pc:sldChg>
+      <pc:sldChg chg="modSp">
+        <pc:chgData name="Joshua Gross" userId="7bb6a70e-9d37-46e4-96de-748557707bd0" providerId="ADAL" clId="{C167259B-8629-4782-A60C-F3EC4D72A2DB}" dt="2023-08-29T20:46:22.240" v="33"/>
+        <pc:sldMkLst>
+          <pc:docMk/>
+          <pc:sldMk cId="1754274112" sldId="347"/>
+        </pc:sldMkLst>
+        <pc:spChg chg="mod">
+          <ac:chgData name="Joshua Gross" userId="7bb6a70e-9d37-46e4-96de-748557707bd0" providerId="ADAL" clId="{C167259B-8629-4782-A60C-F3EC4D72A2DB}" dt="2023-08-29T20:46:22.240" v="33"/>
+          <ac:spMkLst>
+            <pc:docMk/>
+            <pc:sldMk cId="1754274112" sldId="347"/>
+            <ac:spMk id="2" creationId="{4ED975F2-38B5-4FBC-B341-C8E4DCEDFB73}"/>
+          </ac:spMkLst>
+        </pc:spChg>
+      </pc:sldChg>
+      <pc:sldChg chg="modSp">
+        <pc:chgData name="Joshua Gross" userId="7bb6a70e-9d37-46e4-96de-748557707bd0" providerId="ADAL" clId="{C167259B-8629-4782-A60C-F3EC4D72A2DB}" dt="2023-08-29T20:46:20.334" v="32"/>
+        <pc:sldMkLst>
+          <pc:docMk/>
+          <pc:sldMk cId="591163137" sldId="348"/>
+        </pc:sldMkLst>
+        <pc:spChg chg="mod">
+          <ac:chgData name="Joshua Gross" userId="7bb6a70e-9d37-46e4-96de-748557707bd0" providerId="ADAL" clId="{C167259B-8629-4782-A60C-F3EC4D72A2DB}" dt="2023-08-29T20:46:20.334" v="32"/>
+          <ac:spMkLst>
+            <pc:docMk/>
+            <pc:sldMk cId="591163137" sldId="348"/>
+            <ac:spMk id="2" creationId="{4ED975F2-38B5-4FBC-B341-C8E4DCEDFB73}"/>
+          </ac:spMkLst>
+        </pc:spChg>
+      </pc:sldChg>
+      <pc:sldChg chg="modSp">
+        <pc:chgData name="Joshua Gross" userId="7bb6a70e-9d37-46e4-96de-748557707bd0" providerId="ADAL" clId="{C167259B-8629-4782-A60C-F3EC4D72A2DB}" dt="2023-08-29T20:46:18.936" v="31"/>
+        <pc:sldMkLst>
+          <pc:docMk/>
+          <pc:sldMk cId="1359992695" sldId="349"/>
+        </pc:sldMkLst>
+        <pc:spChg chg="mod">
+          <ac:chgData name="Joshua Gross" userId="7bb6a70e-9d37-46e4-96de-748557707bd0" providerId="ADAL" clId="{C167259B-8629-4782-A60C-F3EC4D72A2DB}" dt="2023-08-29T20:46:18.936" v="31"/>
+          <ac:spMkLst>
+            <pc:docMk/>
+            <pc:sldMk cId="1359992695" sldId="349"/>
+            <ac:spMk id="2" creationId="{4ED975F2-38B5-4FBC-B341-C8E4DCEDFB73}"/>
+          </ac:spMkLst>
+        </pc:spChg>
+      </pc:sldChg>
+      <pc:sldChg chg="modSp">
+        <pc:chgData name="Joshua Gross" userId="7bb6a70e-9d37-46e4-96de-748557707bd0" providerId="ADAL" clId="{C167259B-8629-4782-A60C-F3EC4D72A2DB}" dt="2023-08-29T20:45:57.752" v="22"/>
+        <pc:sldMkLst>
+          <pc:docMk/>
+          <pc:sldMk cId="1534278564" sldId="350"/>
+        </pc:sldMkLst>
+        <pc:spChg chg="mod">
+          <ac:chgData name="Joshua Gross" userId="7bb6a70e-9d37-46e4-96de-748557707bd0" providerId="ADAL" clId="{C167259B-8629-4782-A60C-F3EC4D72A2DB}" dt="2023-08-29T20:45:57.752" v="22"/>
+          <ac:spMkLst>
+            <pc:docMk/>
+            <pc:sldMk cId="1534278564" sldId="350"/>
+            <ac:spMk id="2" creationId="{4ED975F2-38B5-4FBC-B341-C8E4DCEDFB73}"/>
+          </ac:spMkLst>
+        </pc:spChg>
+      </pc:sldChg>
+      <pc:sldChg chg="modSp">
+        <pc:chgData name="Joshua Gross" userId="7bb6a70e-9d37-46e4-96de-748557707bd0" providerId="ADAL" clId="{C167259B-8629-4782-A60C-F3EC4D72A2DB}" dt="2023-08-29T20:45:59.195" v="23"/>
+        <pc:sldMkLst>
+          <pc:docMk/>
+          <pc:sldMk cId="3354839260" sldId="351"/>
+        </pc:sldMkLst>
+        <pc:spChg chg="mod">
+          <ac:chgData name="Joshua Gross" userId="7bb6a70e-9d37-46e4-96de-748557707bd0" providerId="ADAL" clId="{C167259B-8629-4782-A60C-F3EC4D72A2DB}" dt="2023-08-29T20:45:59.195" v="23"/>
+          <ac:spMkLst>
+            <pc:docMk/>
+            <pc:sldMk cId="3354839260" sldId="351"/>
+            <ac:spMk id="2" creationId="{4ED975F2-38B5-4FBC-B341-C8E4DCEDFB73}"/>
+          </ac:spMkLst>
+        </pc:spChg>
+      </pc:sldChg>
+      <pc:sldChg chg="modSp">
+        <pc:chgData name="Joshua Gross" userId="7bb6a70e-9d37-46e4-96de-748557707bd0" providerId="ADAL" clId="{C167259B-8629-4782-A60C-F3EC4D72A2DB}" dt="2023-08-29T20:46:00.394" v="24"/>
+        <pc:sldMkLst>
+          <pc:docMk/>
+          <pc:sldMk cId="1951183599" sldId="352"/>
+        </pc:sldMkLst>
+        <pc:spChg chg="mod">
+          <ac:chgData name="Joshua Gross" userId="7bb6a70e-9d37-46e4-96de-748557707bd0" providerId="ADAL" clId="{C167259B-8629-4782-A60C-F3EC4D72A2DB}" dt="2023-08-29T20:46:00.394" v="24"/>
+          <ac:spMkLst>
+            <pc:docMk/>
+            <pc:sldMk cId="1951183599" sldId="352"/>
+            <ac:spMk id="2" creationId="{4ED975F2-38B5-4FBC-B341-C8E4DCEDFB73}"/>
+          </ac:spMkLst>
+        </pc:spChg>
+      </pc:sldChg>
+      <pc:sldChg chg="modSp">
+        <pc:chgData name="Joshua Gross" userId="7bb6a70e-9d37-46e4-96de-748557707bd0" providerId="ADAL" clId="{C167259B-8629-4782-A60C-F3EC4D72A2DB}" dt="2023-08-29T20:46:05.881" v="25"/>
+        <pc:sldMkLst>
+          <pc:docMk/>
+          <pc:sldMk cId="963449445" sldId="353"/>
+        </pc:sldMkLst>
+        <pc:spChg chg="mod">
+          <ac:chgData name="Joshua Gross" userId="7bb6a70e-9d37-46e4-96de-748557707bd0" providerId="ADAL" clId="{C167259B-8629-4782-A60C-F3EC4D72A2DB}" dt="2023-08-29T20:46:05.881" v="25"/>
+          <ac:spMkLst>
+            <pc:docMk/>
+            <pc:sldMk cId="963449445" sldId="353"/>
+            <ac:spMk id="2" creationId="{4ED975F2-38B5-4FBC-B341-C8E4DCEDFB73}"/>
+          </ac:spMkLst>
+        </pc:spChg>
+      </pc:sldChg>
+      <pc:sldChg chg="modSp">
+        <pc:chgData name="Joshua Gross" userId="7bb6a70e-9d37-46e4-96de-748557707bd0" providerId="ADAL" clId="{C167259B-8629-4782-A60C-F3EC4D72A2DB}" dt="2023-08-29T20:46:14.527" v="28"/>
+        <pc:sldMkLst>
+          <pc:docMk/>
+          <pc:sldMk cId="615451659" sldId="354"/>
+        </pc:sldMkLst>
+        <pc:spChg chg="mod">
+          <ac:chgData name="Joshua Gross" userId="7bb6a70e-9d37-46e4-96de-748557707bd0" providerId="ADAL" clId="{C167259B-8629-4782-A60C-F3EC4D72A2DB}" dt="2023-08-29T20:46:14.527" v="28"/>
+          <ac:spMkLst>
+            <pc:docMk/>
+            <pc:sldMk cId="615451659" sldId="354"/>
+            <ac:spMk id="2" creationId="{4ED975F2-38B5-4FBC-B341-C8E4DCEDFB73}"/>
+          </ac:spMkLst>
+        </pc:spChg>
+      </pc:sldChg>
+      <pc:sldChg chg="modSp">
+        <pc:chgData name="Joshua Gross" userId="7bb6a70e-9d37-46e4-96de-748557707bd0" providerId="ADAL" clId="{C167259B-8629-4782-A60C-F3EC4D72A2DB}" dt="2023-08-29T20:46:15.993" v="29"/>
+        <pc:sldMkLst>
+          <pc:docMk/>
+          <pc:sldMk cId="512432926" sldId="357"/>
+        </pc:sldMkLst>
+        <pc:spChg chg="mod">
+          <ac:chgData name="Joshua Gross" userId="7bb6a70e-9d37-46e4-96de-748557707bd0" providerId="ADAL" clId="{C167259B-8629-4782-A60C-F3EC4D72A2DB}" dt="2023-08-29T20:46:15.993" v="29"/>
+          <ac:spMkLst>
+            <pc:docMk/>
+            <pc:sldMk cId="512432926" sldId="357"/>
+            <ac:spMk id="2" creationId="{4ED975F2-38B5-4FBC-B341-C8E4DCEDFB73}"/>
+          </ac:spMkLst>
+        </pc:spChg>
+      </pc:sldChg>
+      <pc:sldChg chg="modSp">
+        <pc:chgData name="Joshua Gross" userId="7bb6a70e-9d37-46e4-96de-748557707bd0" providerId="ADAL" clId="{C167259B-8629-4782-A60C-F3EC4D72A2DB}" dt="2023-08-29T20:46:35.841" v="41"/>
+        <pc:sldMkLst>
+          <pc:docMk/>
+          <pc:sldMk cId="1018498956" sldId="360"/>
+        </pc:sldMkLst>
+        <pc:spChg chg="mod">
+          <ac:chgData name="Joshua Gross" userId="7bb6a70e-9d37-46e4-96de-748557707bd0" providerId="ADAL" clId="{C167259B-8629-4782-A60C-F3EC4D72A2DB}" dt="2023-08-29T20:46:35.841" v="41"/>
+          <ac:spMkLst>
+            <pc:docMk/>
+            <pc:sldMk cId="1018498956" sldId="360"/>
+            <ac:spMk id="2" creationId="{4ED975F2-38B5-4FBC-B341-C8E4DCEDFB73}"/>
+          </ac:spMkLst>
+        </pc:spChg>
+      </pc:sldChg>
+      <pc:sldChg chg="modSp">
+        <pc:chgData name="Joshua Gross" userId="7bb6a70e-9d37-46e4-96de-748557707bd0" providerId="ADAL" clId="{C167259B-8629-4782-A60C-F3EC4D72A2DB}" dt="2023-08-29T20:46:16.977" v="30"/>
+        <pc:sldMkLst>
+          <pc:docMk/>
+          <pc:sldMk cId="3999051135" sldId="361"/>
+        </pc:sldMkLst>
+        <pc:spChg chg="mod">
+          <ac:chgData name="Joshua Gross" userId="7bb6a70e-9d37-46e4-96de-748557707bd0" providerId="ADAL" clId="{C167259B-8629-4782-A60C-F3EC4D72A2DB}" dt="2023-08-29T20:46:16.977" v="30"/>
+          <ac:spMkLst>
+            <pc:docMk/>
+            <pc:sldMk cId="3999051135" sldId="361"/>
+            <ac:spMk id="2" creationId="{4ED975F2-38B5-4FBC-B341-C8E4DCEDFB73}"/>
+          </ac:spMkLst>
+        </pc:spChg>
+      </pc:sldChg>
+      <pc:sldChg chg="modSp">
+        <pc:chgData name="Joshua Gross" userId="7bb6a70e-9d37-46e4-96de-748557707bd0" providerId="ADAL" clId="{C167259B-8629-4782-A60C-F3EC4D72A2DB}" dt="2023-08-29T20:46:07.249" v="26"/>
+        <pc:sldMkLst>
+          <pc:docMk/>
+          <pc:sldMk cId="3503523749" sldId="362"/>
+        </pc:sldMkLst>
+        <pc:spChg chg="mod">
+          <ac:chgData name="Joshua Gross" userId="7bb6a70e-9d37-46e4-96de-748557707bd0" providerId="ADAL" clId="{C167259B-8629-4782-A60C-F3EC4D72A2DB}" dt="2023-08-29T20:46:07.249" v="26"/>
+          <ac:spMkLst>
+            <pc:docMk/>
+            <pc:sldMk cId="3503523749" sldId="362"/>
+            <ac:spMk id="2" creationId="{4ED975F2-38B5-4FBC-B341-C8E4DCEDFB73}"/>
+          </ac:spMkLst>
+        </pc:spChg>
+      </pc:sldChg>
+      <pc:sldChg chg="modSp">
+        <pc:chgData name="Joshua Gross" userId="7bb6a70e-9d37-46e4-96de-748557707bd0" providerId="ADAL" clId="{C167259B-8629-4782-A60C-F3EC4D72A2DB}" dt="2023-08-29T20:46:08.424" v="27"/>
+        <pc:sldMkLst>
+          <pc:docMk/>
+          <pc:sldMk cId="390910167" sldId="363"/>
+        </pc:sldMkLst>
+        <pc:spChg chg="mod">
+          <ac:chgData name="Joshua Gross" userId="7bb6a70e-9d37-46e4-96de-748557707bd0" providerId="ADAL" clId="{C167259B-8629-4782-A60C-F3EC4D72A2DB}" dt="2023-08-29T20:46:08.424" v="27"/>
+          <ac:spMkLst>
+            <pc:docMk/>
+            <pc:sldMk cId="390910167" sldId="363"/>
+            <ac:spMk id="2" creationId="{4ED975F2-38B5-4FBC-B341-C8E4DCEDFB73}"/>
+          </ac:spMkLst>
+        </pc:spChg>
+      </pc:sldChg>
+      <pc:sldChg chg="modSp">
+        <pc:chgData name="Joshua Gross" userId="7bb6a70e-9d37-46e4-96de-748557707bd0" providerId="ADAL" clId="{C167259B-8629-4782-A60C-F3EC4D72A2DB}" dt="2023-08-29T20:45:56.049" v="21"/>
+        <pc:sldMkLst>
+          <pc:docMk/>
+          <pc:sldMk cId="1588100019" sldId="364"/>
+        </pc:sldMkLst>
+        <pc:spChg chg="mod">
+          <ac:chgData name="Joshua Gross" userId="7bb6a70e-9d37-46e4-96de-748557707bd0" providerId="ADAL" clId="{C167259B-8629-4782-A60C-F3EC4D72A2DB}" dt="2023-08-29T20:45:56.049" v="21"/>
+          <ac:spMkLst>
+            <pc:docMk/>
+            <pc:sldMk cId="1588100019" sldId="364"/>
+            <ac:spMk id="2" creationId="{4ED975F2-38B5-4FBC-B341-C8E4DCEDFB73}"/>
+          </ac:spMkLst>
+        </pc:spChg>
+      </pc:sldChg>
+      <pc:sldChg chg="modSp">
+        <pc:chgData name="Joshua Gross" userId="7bb6a70e-9d37-46e4-96de-748557707bd0" providerId="ADAL" clId="{C167259B-8629-4782-A60C-F3EC4D72A2DB}" dt="2023-08-29T20:45:53.795" v="20" actId="6549"/>
+        <pc:sldMkLst>
+          <pc:docMk/>
+          <pc:sldMk cId="2197832117" sldId="366"/>
+        </pc:sldMkLst>
+        <pc:spChg chg="mod">
+          <ac:chgData name="Joshua Gross" userId="7bb6a70e-9d37-46e4-96de-748557707bd0" providerId="ADAL" clId="{C167259B-8629-4782-A60C-F3EC4D72A2DB}" dt="2023-08-29T20:45:53.795" v="20" actId="6549"/>
+          <ac:spMkLst>
+            <pc:docMk/>
+            <pc:sldMk cId="2197832117" sldId="366"/>
+            <ac:spMk id="2" creationId="{4ED975F2-38B5-4FBC-B341-C8E4DCEDFB73}"/>
+          </ac:spMkLst>
+        </pc:spChg>
+      </pc:sldChg>
+    </pc:docChg>
+  </pc:docChgLst>
+</pc:chgInfo>
 </file>
 
 <file path=ppt/slideLayouts/slideLayout1.xml><?xml version="1.0" encoding="utf-8"?>
@@ -3653,7 +4242,7 @@
           <a:p>
             <a:r>
               <a:rPr lang="en-US" dirty="0"/>
-              <a:t>Converting from Decimal to Binary</a:t>
+              <a:t>Converting from Binary to Decimal</a:t>
             </a:r>
           </a:p>
         </p:txBody>
@@ -4191,7 +4780,7 @@
           <a:p>
             <a:r>
               <a:rPr lang="en-US" dirty="0"/>
-              <a:t>Converting from Decimal to Binary</a:t>
+              <a:t>Converting from Binary to Decimal</a:t>
             </a:r>
           </a:p>
         </p:txBody>
@@ -4745,7 +5334,7 @@
           <a:p>
             <a:r>
               <a:rPr lang="en-US" dirty="0"/>
-              <a:t>Converting from Decimal to Binary</a:t>
+              <a:t>Converting from Binary to Decimal</a:t>
             </a:r>
           </a:p>
         </p:txBody>
@@ -5311,7 +5900,7 @@
           <a:p>
             <a:r>
               <a:rPr lang="en-US" dirty="0"/>
-              <a:t>Converting from Decimal to Binary</a:t>
+              <a:t>Converting from Binary to Decimal</a:t>
             </a:r>
           </a:p>
         </p:txBody>
@@ -5901,7 +6490,7 @@
           <a:p>
             <a:r>
               <a:rPr lang="en-US" dirty="0"/>
-              <a:t>Converting from Decimal to Binary</a:t>
+              <a:t>Converting from Binary to Decimal</a:t>
             </a:r>
           </a:p>
         </p:txBody>
@@ -6519,7 +7108,7 @@
           <a:p>
             <a:r>
               <a:rPr lang="en-US" dirty="0"/>
-              <a:t>Converting from Decimal to Binary</a:t>
+              <a:t>Converting from Binary to Decimal</a:t>
             </a:r>
           </a:p>
         </p:txBody>
@@ -7150,7 +7739,7 @@
           <a:p>
             <a:r>
               <a:rPr lang="en-US" dirty="0"/>
-              <a:t>Converting from Decimal to Binary</a:t>
+              <a:t>Converting from Binary to Decimal</a:t>
             </a:r>
           </a:p>
         </p:txBody>
@@ -7249,7 +7838,7 @@
           <a:p>
             <a:r>
               <a:rPr lang="en-US" dirty="0"/>
-              <a:t>Converting from Decimal to Binary</a:t>
+              <a:t>Converting from Binary to Decimal</a:t>
             </a:r>
           </a:p>
         </p:txBody>
@@ -22066,7 +22655,7 @@
           <a:p>
             <a:r>
               <a:rPr lang="en-US" dirty="0"/>
-              <a:t>Converting from Decimal to Binary</a:t>
+              <a:t>Converting from Binary to Decimal</a:t>
             </a:r>
           </a:p>
         </p:txBody>
@@ -22159,7 +22748,7 @@
           <a:p>
             <a:r>
               <a:rPr lang="en-US" dirty="0"/>
-              <a:t>Converting from Decimal to Binary</a:t>
+              <a:t>Converting from Binary to Decimal</a:t>
             </a:r>
           </a:p>
         </p:txBody>
@@ -22258,7 +22847,7 @@
           <a:p>
             <a:r>
               <a:rPr lang="en-US" dirty="0"/>
-              <a:t>Converting from Decimal to Binary</a:t>
+              <a:t>Converting from Binary to Decimal</a:t>
             </a:r>
           </a:p>
         </p:txBody>
@@ -22364,7 +22953,7 @@
           <a:p>
             <a:r>
               <a:rPr lang="en-US" dirty="0"/>
-              <a:t>Converting from Decimal to Binary</a:t>
+              <a:t>Converting from Binary to Decimal</a:t>
             </a:r>
           </a:p>
         </p:txBody>
@@ -22477,7 +23066,7 @@
           <a:p>
             <a:r>
               <a:rPr lang="en-US" dirty="0"/>
-              <a:t>Converting from Decimal to Binary</a:t>
+              <a:t>Converting from Binary to Decimal</a:t>
             </a:r>
           </a:p>
         </p:txBody>
@@ -22597,7 +23186,7 @@
           <a:p>
             <a:r>
               <a:rPr lang="en-US" dirty="0"/>
-              <a:t>Converting from Decimal to Binary</a:t>
+              <a:t>Converting from Binary to Decimal</a:t>
             </a:r>
           </a:p>
         </p:txBody>
@@ -22723,7 +23312,7 @@
           <a:p>
             <a:r>
               <a:rPr lang="en-US" dirty="0"/>
-              <a:t>Converting from Decimal to Binary</a:t>
+              <a:t>Converting from Binary to Decimal</a:t>
             </a:r>
           </a:p>
         </p:txBody>
@@ -22852,7 +23441,7 @@
           <a:p>
             <a:r>
               <a:rPr lang="en-US" dirty="0"/>
-              <a:t>Converting from Decimal to Binary</a:t>
+              <a:t>Converting from Binary to Decimal</a:t>
             </a:r>
           </a:p>
         </p:txBody>
@@ -23000,7 +23589,7 @@
           <a:p>
             <a:r>
               <a:rPr lang="en-US" dirty="0"/>
-              <a:t>Converting from Decimal to Binary</a:t>
+              <a:t>Converting from Binary to Decimal</a:t>
             </a:r>
           </a:p>
         </p:txBody>
@@ -23176,7 +23765,7 @@
           <a:p>
             <a:r>
               <a:rPr lang="en-US" dirty="0"/>
-              <a:t>Converting from Decimal to Binary</a:t>
+              <a:t>Converting from Binary to Decimal</a:t>
             </a:r>
           </a:p>
         </p:txBody>
@@ -23474,7 +24063,7 @@
           <a:p>
             <a:r>
               <a:rPr lang="en-US" dirty="0"/>
-              <a:t>Converting from Decimal to Binary</a:t>
+              <a:t>Converting from Binary to Decimal</a:t>
             </a:r>
           </a:p>
         </p:txBody>
@@ -23596,7 +24185,7 @@
           <a:p>
             <a:r>
               <a:rPr lang="en-US" dirty="0"/>
-              <a:t>Converting from Decimal to Binary</a:t>
+              <a:t>Converting from Binary to Decimal</a:t>
             </a:r>
           </a:p>
         </p:txBody>
@@ -23730,7 +24319,7 @@
           <a:p>
             <a:r>
               <a:rPr lang="en-US" dirty="0"/>
-              <a:t>Converting from Decimal to Binary</a:t>
+              <a:t>Converting from Binary to Decimal</a:t>
             </a:r>
           </a:p>
         </p:txBody>
@@ -23886,7 +24475,7 @@
           <a:p>
             <a:r>
               <a:rPr lang="en-US" dirty="0"/>
-              <a:t>Converting from Decimal to Binary</a:t>
+              <a:t>Converting from Binary to Decimal</a:t>
             </a:r>
           </a:p>
         </p:txBody>
@@ -24070,7 +24659,7 @@
           <a:p>
             <a:r>
               <a:rPr lang="en-US" dirty="0"/>
-              <a:t>Converting from Decimal to Binary</a:t>
+              <a:t>Converting from Binary to Decimal</a:t>
             </a:r>
           </a:p>
         </p:txBody>
@@ -24272,7 +24861,7 @@
           <a:p>
             <a:r>
               <a:rPr lang="en-US" dirty="0"/>
-              <a:t>Converting from Decimal to Binary</a:t>
+              <a:t>Converting from Binary to Decimal</a:t>
             </a:r>
           </a:p>
         </p:txBody>
@@ -24481,7 +25070,7 @@
           <a:p>
             <a:r>
               <a:rPr lang="en-US" dirty="0"/>
-              <a:t>Converting from Decimal to Binary</a:t>
+              <a:t>Converting from Binary to Decimal</a:t>
             </a:r>
           </a:p>
         </p:txBody>
@@ -24878,7 +25467,7 @@
           <a:p>
             <a:r>
               <a:rPr lang="en-US" dirty="0"/>
-              <a:t>Converting from Decimal to Binary</a:t>
+              <a:t>Converting from Binary to Decimal</a:t>
             </a:r>
           </a:p>
         </p:txBody>
@@ -25287,7 +25876,7 @@
           <a:p>
             <a:r>
               <a:rPr lang="en-US" dirty="0"/>
-              <a:t>Converting from Decimal to Binary</a:t>
+              <a:t>Converting from Binary to Decimal</a:t>
             </a:r>
           </a:p>
         </p:txBody>
@@ -25708,7 +26297,7 @@
           <a:p>
             <a:r>
               <a:rPr lang="en-US" dirty="0"/>
-              <a:t>Converting from Decimal to Binary</a:t>
+              <a:t>Converting from Binary to Decimal</a:t>
             </a:r>
           </a:p>
         </p:txBody>
@@ -26255,7 +26844,7 @@
           <a:p>
             <a:r>
               <a:rPr lang="en-US" dirty="0"/>
-              <a:t>Converting from Decimal to Binary</a:t>
+              <a:t>Converting from Binary to Decimal</a:t>
             </a:r>
           </a:p>
         </p:txBody>
@@ -26700,7 +27289,7 @@
           <a:p>
             <a:r>
               <a:rPr lang="en-US" dirty="0"/>
-              <a:t>Converting from Decimal to Binary</a:t>
+              <a:t>Converting from Binary to Decimal</a:t>
             </a:r>
           </a:p>
         </p:txBody>
@@ -27157,7 +27746,7 @@
           <a:p>
             <a:r>
               <a:rPr lang="en-US" dirty="0"/>
-              <a:t>Converting from Decimal to Binary</a:t>
+              <a:t>Converting from Binary to Decimal</a:t>
             </a:r>
           </a:p>
         </p:txBody>
@@ -27630,7 +28219,7 @@
           <a:p>
             <a:r>
               <a:rPr lang="en-US" dirty="0"/>
-              <a:t>Converting from Decimal to Binary</a:t>
+              <a:t>Converting from Binary to Decimal</a:t>
             </a:r>
           </a:p>
         </p:txBody>
@@ -28119,7 +28708,7 @@
           <a:p>
             <a:r>
               <a:rPr lang="en-US" dirty="0"/>
-              <a:t>Converting from Decimal to Binary</a:t>
+              <a:t>Converting from Binary to Decimal</a:t>
             </a:r>
           </a:p>
         </p:txBody>
@@ -28219,7 +28808,7 @@
           <a:p>
             <a:r>
               <a:rPr lang="en-US" dirty="0"/>
-              <a:t>Converting from Decimal to Binary</a:t>
+              <a:t>Converting from Binary to Decimal</a:t>
             </a:r>
           </a:p>
         </p:txBody>
@@ -28318,7 +28907,7 @@
           <a:p>
             <a:r>
               <a:rPr lang="en-US" dirty="0"/>
-              <a:t>Converting from Decimal to Binary</a:t>
+              <a:t>Converting from Binary to Decimal</a:t>
             </a:r>
           </a:p>
         </p:txBody>
@@ -28780,7 +29369,7 @@
           <a:p>
             <a:r>
               <a:rPr lang="en-US" dirty="0"/>
-              <a:t>Converting from Decimal to Binary</a:t>
+              <a:t>Converting from Binary to Decimal</a:t>
             </a:r>
           </a:p>
         </p:txBody>
@@ -29258,7 +29847,7 @@
           <a:p>
             <a:r>
               <a:rPr lang="en-US" dirty="0"/>
-              <a:t>Converting from Decimal to Binary</a:t>
+              <a:t>Converting from Binary to Decimal</a:t>
             </a:r>
           </a:p>
         </p:txBody>
@@ -29764,7 +30353,7 @@
           <a:p>
             <a:r>
               <a:rPr lang="en-US" dirty="0"/>
-              <a:t>Converting from Decimal to Binary</a:t>
+              <a:t>Converting from Binary to Decimal</a:t>
             </a:r>
           </a:p>
         </p:txBody>
@@ -30534,6 +31123,12 @@
 </file>
 
 <file path=customXml/item1.xml><?xml version="1.0" encoding="utf-8"?>
+<p:properties xmlns:p="http://schemas.microsoft.com/office/2006/metadata/properties" xmlns:xsi="http://www.w3.org/2001/XMLSchema-instance" xmlns:pc="http://schemas.microsoft.com/office/infopath/2007/PartnerControls">
+  <documentManagement/>
+</p:properties>
+</file>
+
+<file path=customXml/item2.xml><?xml version="1.0" encoding="utf-8"?>
 <ct:contentTypeSchema xmlns:ct="http://schemas.microsoft.com/office/2006/metadata/contentType" xmlns:ma="http://schemas.microsoft.com/office/2006/metadata/properties/metaAttributes" ct:_="" ma:_="" ma:contentTypeName="Document" ma:contentTypeID="0x010100560B5B77A830FC46B2AE00BAF7D52A54" ma:contentTypeVersion="7" ma:contentTypeDescription="Create a new document." ma:contentTypeScope="" ma:versionID="b4505af7389e3055bf286c471b435ab2">
   <xsd:schema xmlns:xsd="http://www.w3.org/2001/XMLSchema" xmlns:xs="http://www.w3.org/2001/XMLSchema" xmlns:p="http://schemas.microsoft.com/office/2006/metadata/properties" xmlns:ns3="8c07c512-1ff3-44bd-87df-82ef976e112f" targetNamespace="http://schemas.microsoft.com/office/2006/metadata/properties" ma:root="true" ma:fieldsID="6f058549addda5694cbd4e31095b42cb" ns3:_="">
     <xsd:import namespace="8c07c512-1ff3-44bd-87df-82ef976e112f"/>
@@ -30695,7 +31290,7 @@
 </ct:contentTypeSchema>
 </file>
 
-<file path=customXml/item2.xml><?xml version="1.0" encoding="utf-8"?>
+<file path=customXml/item3.xml><?xml version="1.0" encoding="utf-8"?>
 <?mso-contentType ?>
 <FormTemplates xmlns="http://schemas.microsoft.com/sharepoint/v3/contenttype/forms">
   <Display>DocumentLibraryForm</Display>
@@ -30704,13 +31299,23 @@
 </FormTemplates>
 </file>
 
-<file path=customXml/item3.xml><?xml version="1.0" encoding="utf-8"?>
-<p:properties xmlns:p="http://schemas.microsoft.com/office/2006/metadata/properties" xmlns:xsi="http://www.w3.org/2001/XMLSchema-instance" xmlns:pc="http://schemas.microsoft.com/office/infopath/2007/PartnerControls">
-  <documentManagement/>
-</p:properties>
+<file path=customXml/itemProps1.xml><?xml version="1.0" encoding="utf-8"?>
+<ds:datastoreItem xmlns:ds="http://schemas.openxmlformats.org/officeDocument/2006/customXml" ds:itemID="{D7BA0017-AA77-4379-A737-2874EF0D50A4}">
+  <ds:schemaRefs>
+    <ds:schemaRef ds:uri="http://purl.org/dc/elements/1.1/"/>
+    <ds:schemaRef ds:uri="http://schemas.microsoft.com/office/2006/metadata/properties"/>
+    <ds:schemaRef ds:uri="8c07c512-1ff3-44bd-87df-82ef976e112f"/>
+    <ds:schemaRef ds:uri="http://purl.org/dc/terms/"/>
+    <ds:schemaRef ds:uri="http://schemas.openxmlformats.org/package/2006/metadata/core-properties"/>
+    <ds:schemaRef ds:uri="http://schemas.microsoft.com/office/2006/documentManagement/types"/>
+    <ds:schemaRef ds:uri="http://schemas.microsoft.com/office/infopath/2007/PartnerControls"/>
+    <ds:schemaRef ds:uri="http://www.w3.org/XML/1998/namespace"/>
+    <ds:schemaRef ds:uri="http://purl.org/dc/dcmitype/"/>
+  </ds:schemaRefs>
+</ds:datastoreItem>
 </file>
 
-<file path=customXml/itemProps1.xml><?xml version="1.0" encoding="utf-8"?>
+<file path=customXml/itemProps2.xml><?xml version="1.0" encoding="utf-8"?>
 <ds:datastoreItem xmlns:ds="http://schemas.openxmlformats.org/officeDocument/2006/customXml" ds:itemID="{31401AE1-3A9E-4D46-B40F-5F7925B09B99}">
   <ds:schemaRefs>
     <ds:schemaRef ds:uri="http://schemas.microsoft.com/office/2006/metadata/contentType"/>
@@ -30728,26 +31333,10 @@
 </ds:datastoreItem>
 </file>
 
-<file path=customXml/itemProps2.xml><?xml version="1.0" encoding="utf-8"?>
+<file path=customXml/itemProps3.xml><?xml version="1.0" encoding="utf-8"?>
 <ds:datastoreItem xmlns:ds="http://schemas.openxmlformats.org/officeDocument/2006/customXml" ds:itemID="{8E84D59B-40AB-45F9-806D-516CD318AB7B}">
   <ds:schemaRefs>
     <ds:schemaRef ds:uri="http://schemas.microsoft.com/sharepoint/v3/contenttype/forms"/>
   </ds:schemaRefs>
 </ds:datastoreItem>
-</file>
-
-<file path=customXml/itemProps3.xml><?xml version="1.0" encoding="utf-8"?>
-<ds:datastoreItem xmlns:ds="http://schemas.openxmlformats.org/officeDocument/2006/customXml" ds:itemID="{D7BA0017-AA77-4379-A737-2874EF0D50A4}">
-  <ds:schemaRefs>
-    <ds:schemaRef ds:uri="http://purl.org/dc/dcmitype/"/>
-    <ds:schemaRef ds:uri="http://purl.org/dc/elements/1.1/"/>
-    <ds:schemaRef ds:uri="http://schemas.microsoft.com/office/2006/metadata/properties"/>
-    <ds:schemaRef ds:uri="http://schemas.microsoft.com/office/2006/documentManagement/types"/>
-    <ds:schemaRef ds:uri="http://schemas.microsoft.com/office/infopath/2007/PartnerControls"/>
-    <ds:schemaRef ds:uri="http://purl.org/dc/terms/"/>
-    <ds:schemaRef ds:uri="http://schemas.openxmlformats.org/package/2006/metadata/core-properties"/>
-    <ds:schemaRef ds:uri="8c07c512-1ff3-44bd-87df-82ef976e112f"/>
-    <ds:schemaRef ds:uri="http://www.w3.org/XML/1998/namespace"/>
-  </ds:schemaRefs>
-</ds:datastoreItem>
 </file>
</xml_diff>